<commit_message>
Added an extended version of the presentation
</commit_message>
<xml_diff>
--- a/Holovko Eugene NeuroMath.pptx
+++ b/Holovko Eugene NeuroMath.pptx
@@ -15,9 +15,9 @@
     <p:sldId id="269" r:id="rId6"/>
     <p:sldId id="265" r:id="rId7"/>
     <p:sldId id="270" r:id="rId8"/>
-    <p:sldId id="279" r:id="rId9"/>
-    <p:sldId id="278" r:id="rId10"/>
-    <p:sldId id="271" r:id="rId11"/>
+    <p:sldId id="271" r:id="rId9"/>
+    <p:sldId id="279" r:id="rId10"/>
+    <p:sldId id="278" r:id="rId11"/>
   </p:sldIdLst>
   <p:sldSz cx="9144000" cy="6858000" type="screen4x3"/>
   <p:notesSz cx="6858000" cy="9144000"/>
@@ -15759,7 +15759,7 @@
           <a:p>
             <a:fld id="{DE6C89AF-3919-4BDB-BA27-C705EB35B302}" type="datetimeFigureOut">
               <a:rPr lang="uk-UA" smtClean="0"/>
-              <a:t>15.02.2020</a:t>
+              <a:t>01.08.2021</a:t>
             </a:fld>
             <a:endParaRPr lang="uk-UA"/>
           </a:p>
@@ -17536,7 +17536,7 @@
           <a:p>
             <a:fld id="{555B0BA3-3B82-491E-BFB9-F677DEB052D8}" type="slidenum">
               <a:rPr lang="uk-UA" smtClean="0"/>
-              <a:t>8</a:t>
+              <a:t>9</a:t>
             </a:fld>
             <a:endParaRPr lang="uk-UA"/>
           </a:p>
@@ -17620,7 +17620,7 @@
           <a:p>
             <a:fld id="{555B0BA3-3B82-491E-BFB9-F677DEB052D8}" type="slidenum">
               <a:rPr lang="uk-UA" smtClean="0"/>
-              <a:t>9</a:t>
+              <a:t>10</a:t>
             </a:fld>
             <a:endParaRPr lang="uk-UA"/>
           </a:p>
@@ -17802,7 +17802,7 @@
           <a:p>
             <a:fld id="{3F9414B3-E527-4636-BFA6-684073494173}" type="datetime1">
               <a:rPr lang="uk-UA" smtClean="0"/>
-              <a:t>15.02.2020</a:t>
+              <a:t>01.08.2021</a:t>
             </a:fld>
             <a:endParaRPr lang="uk-UA"/>
           </a:p>
@@ -17972,7 +17972,7 @@
           <a:p>
             <a:fld id="{431537E0-27BB-44B1-A7AA-42E557B85694}" type="datetime1">
               <a:rPr lang="uk-UA" smtClean="0"/>
-              <a:t>15.02.2020</a:t>
+              <a:t>01.08.2021</a:t>
             </a:fld>
             <a:endParaRPr lang="uk-UA"/>
           </a:p>
@@ -18152,7 +18152,7 @@
           <a:p>
             <a:fld id="{5F5AABBC-2839-4581-B809-A5CF2F7A95E5}" type="datetime1">
               <a:rPr lang="uk-UA" smtClean="0"/>
-              <a:t>15.02.2020</a:t>
+              <a:t>01.08.2021</a:t>
             </a:fld>
             <a:endParaRPr lang="uk-UA"/>
           </a:p>
@@ -18322,7 +18322,7 @@
           <a:p>
             <a:fld id="{4E2C73E5-F1D4-4C50-A24C-089C758E18F1}" type="datetime1">
               <a:rPr lang="uk-UA" smtClean="0"/>
-              <a:t>15.02.2020</a:t>
+              <a:t>01.08.2021</a:t>
             </a:fld>
             <a:endParaRPr lang="uk-UA"/>
           </a:p>
@@ -18590,7 +18590,7 @@
           <a:p>
             <a:fld id="{31A05D9B-FC07-4B43-A7C1-53A4892233B7}" type="datetime1">
               <a:rPr lang="uk-UA" smtClean="0"/>
-              <a:t>15.02.2020</a:t>
+              <a:t>01.08.2021</a:t>
             </a:fld>
             <a:endParaRPr lang="uk-UA"/>
           </a:p>
@@ -18822,7 +18822,7 @@
           <a:p>
             <a:fld id="{DCD16722-C712-43B4-8CE1-65362B56BB7B}" type="datetime1">
               <a:rPr lang="uk-UA" smtClean="0"/>
-              <a:t>15.02.2020</a:t>
+              <a:t>01.08.2021</a:t>
             </a:fld>
             <a:endParaRPr lang="uk-UA"/>
           </a:p>
@@ -19181,7 +19181,7 @@
           <a:p>
             <a:fld id="{38597428-6C91-4EFF-AC02-00E03656E5A3}" type="datetime1">
               <a:rPr lang="uk-UA" smtClean="0"/>
-              <a:t>15.02.2020</a:t>
+              <a:t>01.08.2021</a:t>
             </a:fld>
             <a:endParaRPr lang="uk-UA"/>
           </a:p>
@@ -19322,7 +19322,7 @@
           <a:p>
             <a:fld id="{E038E09D-D51F-474B-AB12-5448963EE909}" type="datetime1">
               <a:rPr lang="uk-UA" smtClean="0"/>
-              <a:t>15.02.2020</a:t>
+              <a:t>01.08.2021</a:t>
             </a:fld>
             <a:endParaRPr lang="uk-UA"/>
           </a:p>
@@ -19417,7 +19417,7 @@
           <a:p>
             <a:fld id="{093A0A21-0104-4524-8EDB-2E4C4048865C}" type="datetime1">
               <a:rPr lang="uk-UA" smtClean="0"/>
-              <a:t>15.02.2020</a:t>
+              <a:t>01.08.2021</a:t>
             </a:fld>
             <a:endParaRPr lang="uk-UA"/>
           </a:p>
@@ -19774,7 +19774,7 @@
           <a:p>
             <a:fld id="{711C7522-5A1E-4E7D-864D-A2CB5D5BDF71}" type="datetime1">
               <a:rPr lang="uk-UA" smtClean="0"/>
-              <a:t>15.02.2020</a:t>
+              <a:t>01.08.2021</a:t>
             </a:fld>
             <a:endParaRPr lang="uk-UA"/>
           </a:p>
@@ -20133,7 +20133,7 @@
           <a:p>
             <a:fld id="{98E2AB37-AD99-470C-8804-7A7A886326B8}" type="datetime1">
               <a:rPr lang="uk-UA" smtClean="0"/>
-              <a:t>15.02.2020</a:t>
+              <a:t>01.08.2021</a:t>
             </a:fld>
             <a:endParaRPr lang="uk-UA"/>
           </a:p>
@@ -20377,7 +20377,7 @@
           <a:p>
             <a:fld id="{830CE08C-8DD4-4586-9479-2A94B73B5AFB}" type="datetime1">
               <a:rPr lang="uk-UA" smtClean="0"/>
-              <a:t>15.02.2020</a:t>
+              <a:t>01.08.2021</a:t>
             </a:fld>
             <a:endParaRPr lang="uk-UA"/>
           </a:p>
@@ -21266,7 +21266,7 @@
 </file>
 
 <file path=ppt/slides/slide10.xml><?xml version="1.0" encoding="utf-8"?>
-<p:sld xmlns:a="http://schemas.openxmlformats.org/drawingml/2006/main" xmlns:r="http://schemas.openxmlformats.org/officeDocument/2006/relationships" xmlns:p="http://schemas.openxmlformats.org/presentationml/2006/main" show="0">
+<p:sld xmlns:a="http://schemas.openxmlformats.org/drawingml/2006/main" xmlns:r="http://schemas.openxmlformats.org/officeDocument/2006/relationships" xmlns:p="http://schemas.openxmlformats.org/presentationml/2006/main">
   <p:cSld>
     <p:spTree>
       <p:nvGrpSpPr>
@@ -21284,714 +21284,10 @@
       </p:grpSpPr>
       <p:sp>
         <p:nvSpPr>
-          <p:cNvPr id="2" name="TextBox 1">
+          <p:cNvPr id="2" name="Місце для номера слайда 1">
             <a:extLst>
               <a:ext uri="{FF2B5EF4-FFF2-40B4-BE49-F238E27FC236}">
-                <a16:creationId xmlns:a16="http://schemas.microsoft.com/office/drawing/2014/main" id="{3C061724-5385-49B8-8B03-210533F79FC9}"/>
-              </a:ext>
-            </a:extLst>
-          </p:cNvPr>
-          <p:cNvSpPr txBox="1"/>
-          <p:nvPr/>
-        </p:nvSpPr>
-        <p:spPr>
-          <a:xfrm>
-            <a:off x="1187740" y="280180"/>
-            <a:ext cx="6768520" cy="646331"/>
-          </a:xfrm>
-          <a:prstGeom prst="rect">
-            <a:avLst/>
-          </a:prstGeom>
-          <a:noFill/>
-        </p:spPr>
-        <p:txBody>
-          <a:bodyPr wrap="none" rtlCol="0">
-            <a:spAutoFit/>
-          </a:bodyPr>
-          <a:lstStyle/>
-          <a:p>
-            <a:r>
-              <a:rPr lang="uk-UA" sz="3600" dirty="0"/>
-              <a:t>Підрахунок розпізнаного виразу</a:t>
-            </a:r>
-          </a:p>
-        </p:txBody>
-      </p:sp>
-      <p:grpSp>
-        <p:nvGrpSpPr>
-          <p:cNvPr id="10" name="Групувати 9">
-            <a:extLst>
-              <a:ext uri="{FF2B5EF4-FFF2-40B4-BE49-F238E27FC236}">
-                <a16:creationId xmlns:a16="http://schemas.microsoft.com/office/drawing/2014/main" id="{5832C6A6-CCDF-4831-95E9-CA8CC5FCB404}"/>
-              </a:ext>
-            </a:extLst>
-          </p:cNvPr>
-          <p:cNvGrpSpPr/>
-          <p:nvPr/>
-        </p:nvGrpSpPr>
-        <p:grpSpPr>
-          <a:xfrm>
-            <a:off x="6787333" y="2655174"/>
-            <a:ext cx="1846211" cy="1169551"/>
-            <a:chOff x="4572000" y="1315616"/>
-            <a:chExt cx="1846211" cy="1169551"/>
-          </a:xfrm>
-        </p:grpSpPr>
-        <p:sp>
-          <p:nvSpPr>
-            <p:cNvPr id="4" name="TextBox 3">
-              <a:extLst>
-                <a:ext uri="{FF2B5EF4-FFF2-40B4-BE49-F238E27FC236}">
-                  <a16:creationId xmlns:a16="http://schemas.microsoft.com/office/drawing/2014/main" id="{57CEE6DA-0293-4AFB-BA10-D330C125A9E5}"/>
-                </a:ext>
-              </a:extLst>
-            </p:cNvPr>
-            <p:cNvSpPr txBox="1"/>
-            <p:nvPr/>
-          </p:nvSpPr>
-          <p:spPr>
-            <a:xfrm>
-              <a:off x="4572000" y="1315616"/>
-              <a:ext cx="1846211" cy="1169551"/>
-            </a:xfrm>
-            <a:prstGeom prst="rect">
-              <a:avLst/>
-            </a:prstGeom>
-            <a:noFill/>
-          </p:spPr>
-          <p:txBody>
-            <a:bodyPr wrap="none" rtlCol="0">
-              <a:spAutoFit/>
-            </a:bodyPr>
-            <a:lstStyle/>
-            <a:p>
-              <a:pPr marL="285750" lvl="0" indent="-285750">
-                <a:buFont typeface="Arial" panose="020B0604020202020204" pitchFamily="34" charset="0"/>
-                <a:buChar char="•"/>
-              </a:pPr>
-              <a:r>
-                <a:rPr lang="uk-UA" sz="1400" dirty="0"/>
-                <a:t>Оператори</a:t>
-              </a:r>
-            </a:p>
-            <a:p>
-              <a:pPr marL="285750" lvl="0" indent="-285750">
-                <a:buFont typeface="Arial" panose="020B0604020202020204" pitchFamily="34" charset="0"/>
-                <a:buChar char="•"/>
-              </a:pPr>
-              <a:r>
-                <a:rPr lang="uk-UA" sz="1400" dirty="0"/>
-                <a:t>Числа і константи</a:t>
-              </a:r>
-            </a:p>
-            <a:p>
-              <a:pPr marL="285750" lvl="0" indent="-285750">
-                <a:buFont typeface="Arial" panose="020B0604020202020204" pitchFamily="34" charset="0"/>
-                <a:buChar char="•"/>
-              </a:pPr>
-              <a:r>
-                <a:rPr lang="uk-UA" sz="1400" dirty="0"/>
-                <a:t>Функції</a:t>
-              </a:r>
-            </a:p>
-            <a:p>
-              <a:pPr marL="285750" lvl="0" indent="-285750">
-                <a:buFont typeface="Arial" panose="020B0604020202020204" pitchFamily="34" charset="0"/>
-                <a:buChar char="•"/>
-              </a:pPr>
-              <a:r>
-                <a:rPr lang="uk-UA" sz="1400" dirty="0" err="1"/>
-                <a:t>Спец.символи</a:t>
-              </a:r>
-              <a:endParaRPr lang="uk-UA" sz="1400" dirty="0"/>
-            </a:p>
-            <a:p>
-              <a:pPr marL="285750" lvl="0" indent="-285750">
-                <a:buFont typeface="Arial" panose="020B0604020202020204" pitchFamily="34" charset="0"/>
-                <a:buChar char="•"/>
-              </a:pPr>
-              <a:r>
-                <a:rPr lang="uk-UA" sz="1400" dirty="0" err="1"/>
-                <a:t>Спец.операції</a:t>
-              </a:r>
-              <a:endParaRPr lang="uk-UA" sz="1400" dirty="0"/>
-            </a:p>
-          </p:txBody>
-        </p:sp>
-        <p:sp>
-          <p:nvSpPr>
-            <p:cNvPr id="5" name="Овал 4">
-              <a:extLst>
-                <a:ext uri="{FF2B5EF4-FFF2-40B4-BE49-F238E27FC236}">
-                  <a16:creationId xmlns:a16="http://schemas.microsoft.com/office/drawing/2014/main" id="{9916A7A6-6D44-46BD-A80C-B8BF7CE102D6}"/>
-                </a:ext>
-              </a:extLst>
-            </p:cNvPr>
-            <p:cNvSpPr/>
-            <p:nvPr/>
-          </p:nvSpPr>
-          <p:spPr>
-            <a:xfrm>
-              <a:off x="4632928" y="1399592"/>
-              <a:ext cx="102637" cy="102637"/>
-            </a:xfrm>
-            <a:prstGeom prst="ellipse">
-              <a:avLst/>
-            </a:prstGeom>
-            <a:solidFill>
-              <a:srgbClr val="00B050"/>
-            </a:solidFill>
-            <a:ln>
-              <a:noFill/>
-            </a:ln>
-          </p:spPr>
-          <p:style>
-            <a:lnRef idx="2">
-              <a:schemeClr val="accent1">
-                <a:shade val="50000"/>
-              </a:schemeClr>
-            </a:lnRef>
-            <a:fillRef idx="1">
-              <a:schemeClr val="accent1"/>
-            </a:fillRef>
-            <a:effectRef idx="0">
-              <a:schemeClr val="accent1"/>
-            </a:effectRef>
-            <a:fontRef idx="minor">
-              <a:schemeClr val="lt1"/>
-            </a:fontRef>
-          </p:style>
-          <p:txBody>
-            <a:bodyPr rtlCol="0" anchor="ctr"/>
-            <a:lstStyle/>
-            <a:p>
-              <a:pPr algn="ctr"/>
-              <a:endParaRPr lang="uk-UA"/>
-            </a:p>
-          </p:txBody>
-        </p:sp>
-        <p:sp>
-          <p:nvSpPr>
-            <p:cNvPr id="6" name="Овал 5">
-              <a:extLst>
-                <a:ext uri="{FF2B5EF4-FFF2-40B4-BE49-F238E27FC236}">
-                  <a16:creationId xmlns:a16="http://schemas.microsoft.com/office/drawing/2014/main" id="{6E252A27-AE78-47F7-92B2-0202A0D0A149}"/>
-                </a:ext>
-              </a:extLst>
-            </p:cNvPr>
-            <p:cNvSpPr/>
-            <p:nvPr/>
-          </p:nvSpPr>
-          <p:spPr>
-            <a:xfrm>
-              <a:off x="4632928" y="1623429"/>
-              <a:ext cx="102637" cy="102637"/>
-            </a:xfrm>
-            <a:prstGeom prst="ellipse">
-              <a:avLst/>
-            </a:prstGeom>
-            <a:solidFill>
-              <a:srgbClr val="0070C0"/>
-            </a:solidFill>
-            <a:ln>
-              <a:noFill/>
-            </a:ln>
-          </p:spPr>
-          <p:style>
-            <a:lnRef idx="2">
-              <a:schemeClr val="accent1">
-                <a:shade val="50000"/>
-              </a:schemeClr>
-            </a:lnRef>
-            <a:fillRef idx="1">
-              <a:schemeClr val="accent1"/>
-            </a:fillRef>
-            <a:effectRef idx="0">
-              <a:schemeClr val="accent1"/>
-            </a:effectRef>
-            <a:fontRef idx="minor">
-              <a:schemeClr val="lt1"/>
-            </a:fontRef>
-          </p:style>
-          <p:txBody>
-            <a:bodyPr rtlCol="0" anchor="ctr"/>
-            <a:lstStyle/>
-            <a:p>
-              <a:pPr algn="ctr"/>
-              <a:endParaRPr lang="uk-UA"/>
-            </a:p>
-          </p:txBody>
-        </p:sp>
-        <p:sp>
-          <p:nvSpPr>
-            <p:cNvPr id="7" name="Овал 6">
-              <a:extLst>
-                <a:ext uri="{FF2B5EF4-FFF2-40B4-BE49-F238E27FC236}">
-                  <a16:creationId xmlns:a16="http://schemas.microsoft.com/office/drawing/2014/main" id="{BE3A3A03-431D-45CE-A5CA-43881A8E17A0}"/>
-                </a:ext>
-              </a:extLst>
-            </p:cNvPr>
-            <p:cNvSpPr/>
-            <p:nvPr/>
-          </p:nvSpPr>
-          <p:spPr>
-            <a:xfrm>
-              <a:off x="4632928" y="1840015"/>
-              <a:ext cx="102637" cy="102637"/>
-            </a:xfrm>
-            <a:prstGeom prst="ellipse">
-              <a:avLst/>
-            </a:prstGeom>
-            <a:solidFill>
-              <a:srgbClr val="FF0000"/>
-            </a:solidFill>
-            <a:ln>
-              <a:noFill/>
-            </a:ln>
-          </p:spPr>
-          <p:style>
-            <a:lnRef idx="2">
-              <a:schemeClr val="accent1">
-                <a:shade val="50000"/>
-              </a:schemeClr>
-            </a:lnRef>
-            <a:fillRef idx="1">
-              <a:schemeClr val="accent1"/>
-            </a:fillRef>
-            <a:effectRef idx="0">
-              <a:schemeClr val="accent1"/>
-            </a:effectRef>
-            <a:fontRef idx="minor">
-              <a:schemeClr val="lt1"/>
-            </a:fontRef>
-          </p:style>
-          <p:txBody>
-            <a:bodyPr rtlCol="0" anchor="ctr"/>
-            <a:lstStyle/>
-            <a:p>
-              <a:pPr algn="ctr"/>
-              <a:endParaRPr lang="uk-UA"/>
-            </a:p>
-          </p:txBody>
-        </p:sp>
-        <p:sp>
-          <p:nvSpPr>
-            <p:cNvPr id="8" name="Овал 7">
-              <a:extLst>
-                <a:ext uri="{FF2B5EF4-FFF2-40B4-BE49-F238E27FC236}">
-                  <a16:creationId xmlns:a16="http://schemas.microsoft.com/office/drawing/2014/main" id="{DD8CB437-4E15-41B7-A41C-D6A54431EB93}"/>
-                </a:ext>
-              </a:extLst>
-            </p:cNvPr>
-            <p:cNvSpPr/>
-            <p:nvPr/>
-          </p:nvSpPr>
-          <p:spPr>
-            <a:xfrm>
-              <a:off x="4632928" y="2056601"/>
-              <a:ext cx="102637" cy="102637"/>
-            </a:xfrm>
-            <a:prstGeom prst="ellipse">
-              <a:avLst/>
-            </a:prstGeom>
-            <a:solidFill>
-              <a:srgbClr val="7030A0"/>
-            </a:solidFill>
-            <a:ln>
-              <a:solidFill>
-                <a:srgbClr val="7030A0"/>
-              </a:solidFill>
-            </a:ln>
-          </p:spPr>
-          <p:style>
-            <a:lnRef idx="2">
-              <a:schemeClr val="accent1">
-                <a:shade val="50000"/>
-              </a:schemeClr>
-            </a:lnRef>
-            <a:fillRef idx="1">
-              <a:schemeClr val="accent1"/>
-            </a:fillRef>
-            <a:effectRef idx="0">
-              <a:schemeClr val="accent1"/>
-            </a:effectRef>
-            <a:fontRef idx="minor">
-              <a:schemeClr val="lt1"/>
-            </a:fontRef>
-          </p:style>
-          <p:txBody>
-            <a:bodyPr rtlCol="0" anchor="ctr"/>
-            <a:lstStyle/>
-            <a:p>
-              <a:pPr algn="ctr"/>
-              <a:endParaRPr lang="uk-UA"/>
-            </a:p>
-          </p:txBody>
-        </p:sp>
-        <p:sp>
-          <p:nvSpPr>
-            <p:cNvPr id="9" name="Овал 8">
-              <a:extLst>
-                <a:ext uri="{FF2B5EF4-FFF2-40B4-BE49-F238E27FC236}">
-                  <a16:creationId xmlns:a16="http://schemas.microsoft.com/office/drawing/2014/main" id="{41971994-0034-4CCC-A3DD-54D084F409DD}"/>
-                </a:ext>
-              </a:extLst>
-            </p:cNvPr>
-            <p:cNvSpPr/>
-            <p:nvPr/>
-          </p:nvSpPr>
-          <p:spPr>
-            <a:xfrm>
-              <a:off x="4632928" y="2270884"/>
-              <a:ext cx="102637" cy="102637"/>
-            </a:xfrm>
-            <a:prstGeom prst="ellipse">
-              <a:avLst/>
-            </a:prstGeom>
-            <a:solidFill>
-              <a:srgbClr val="FFC000"/>
-            </a:solidFill>
-            <a:ln>
-              <a:solidFill>
-                <a:srgbClr val="FFC000"/>
-              </a:solidFill>
-            </a:ln>
-          </p:spPr>
-          <p:style>
-            <a:lnRef idx="2">
-              <a:schemeClr val="accent1">
-                <a:shade val="50000"/>
-              </a:schemeClr>
-            </a:lnRef>
-            <a:fillRef idx="1">
-              <a:schemeClr val="accent1"/>
-            </a:fillRef>
-            <a:effectRef idx="0">
-              <a:schemeClr val="accent1"/>
-            </a:effectRef>
-            <a:fontRef idx="minor">
-              <a:schemeClr val="lt1"/>
-            </a:fontRef>
-          </p:style>
-          <p:txBody>
-            <a:bodyPr rtlCol="0" anchor="ctr"/>
-            <a:lstStyle/>
-            <a:p>
-              <a:pPr algn="ctr"/>
-              <a:endParaRPr lang="uk-UA" dirty="0"/>
-            </a:p>
-          </p:txBody>
-        </p:sp>
-      </p:grpSp>
-      <p:sp>
-        <p:nvSpPr>
-          <p:cNvPr id="11" name="TextBox 10">
-            <a:extLst>
-              <a:ext uri="{FF2B5EF4-FFF2-40B4-BE49-F238E27FC236}">
-                <a16:creationId xmlns:a16="http://schemas.microsoft.com/office/drawing/2014/main" id="{D3185019-F10D-4213-A0F8-B9FF851277EE}"/>
-              </a:ext>
-            </a:extLst>
-          </p:cNvPr>
-          <p:cNvSpPr txBox="1"/>
-          <p:nvPr/>
-        </p:nvSpPr>
-        <p:spPr>
-          <a:xfrm>
-            <a:off x="4040850" y="1311965"/>
-            <a:ext cx="1592103" cy="369332"/>
-          </a:xfrm>
-          <a:prstGeom prst="rect">
-            <a:avLst/>
-          </a:prstGeom>
-          <a:noFill/>
-        </p:spPr>
-        <p:txBody>
-          <a:bodyPr wrap="none" rtlCol="0">
-            <a:spAutoFit/>
-          </a:bodyPr>
-          <a:lstStyle/>
-          <a:p>
-            <a:r>
-              <a:rPr lang="uk-UA" dirty="0"/>
-              <a:t>Приклад для:</a:t>
-            </a:r>
-          </a:p>
-        </p:txBody>
-      </p:sp>
-      <mc:AlternateContent xmlns:mc="http://schemas.openxmlformats.org/markup-compatibility/2006" xmlns:a14="http://schemas.microsoft.com/office/drawing/2010/main">
-        <mc:Choice Requires="a14">
-          <p:sp>
-            <p:nvSpPr>
-              <p:cNvPr id="12" name="Прямокутник 11">
-                <a:extLst>
-                  <a:ext uri="{FF2B5EF4-FFF2-40B4-BE49-F238E27FC236}">
-                    <a16:creationId xmlns:a16="http://schemas.microsoft.com/office/drawing/2014/main" id="{1623C0CC-AE55-4B0A-9584-9AB4FA857426}"/>
-                  </a:ext>
-                </a:extLst>
-              </p:cNvPr>
-              <p:cNvSpPr/>
-              <p:nvPr/>
-            </p:nvSpPr>
-            <p:spPr>
-              <a:xfrm>
-                <a:off x="3138985" y="1802497"/>
-                <a:ext cx="6634212" cy="404983"/>
-              </a:xfrm>
-              <a:prstGeom prst="rect">
-                <a:avLst/>
-              </a:prstGeom>
-            </p:spPr>
-            <p:txBody>
-              <a:bodyPr wrap="square">
-                <a:spAutoFit/>
-              </a:bodyPr>
-              <a:lstStyle/>
-              <a:p>
-                <a:pPr/>
-                <a14:m>
-                  <m:oMathPara xmlns:m="http://schemas.openxmlformats.org/officeDocument/2006/math">
-                    <m:oMathParaPr>
-                      <m:jc m:val="centerGroup"/>
-                    </m:oMathParaPr>
-                    <m:oMath xmlns:m="http://schemas.openxmlformats.org/officeDocument/2006/math">
-                      <m:r>
-                        <a:rPr lang="uk-UA" smtClean="0">
-                          <a:latin typeface="Cambria Math" panose="02040503050406030204" pitchFamily="18" charset="0"/>
-                        </a:rPr>
-                        <m:t>1</m:t>
-                      </m:r>
-                      <m:r>
-                        <a:rPr lang="en-US" b="0" i="0" smtClean="0">
-                          <a:latin typeface="Cambria Math" panose="02040503050406030204" pitchFamily="18" charset="0"/>
-                        </a:rPr>
-                        <m:t>6</m:t>
-                      </m:r>
-                      <m:r>
-                        <a:rPr lang="uk-UA" i="0">
-                          <a:latin typeface="Cambria Math" panose="02040503050406030204" pitchFamily="18" charset="0"/>
-                        </a:rPr>
-                        <m:t>+2∗(5−|−2|)</m:t>
-                      </m:r>
-                      <m:r>
-                        <m:rPr>
-                          <m:lit/>
-                        </m:rPr>
-                        <a:rPr lang="uk-UA" i="0">
-                          <a:latin typeface="Cambria Math" panose="02040503050406030204" pitchFamily="18" charset="0"/>
-                        </a:rPr>
-                        <m:t>^</m:t>
-                      </m:r>
-                      <m:r>
-                        <a:rPr lang="uk-UA" i="0">
-                          <a:latin typeface="Cambria Math" panose="02040503050406030204" pitchFamily="18" charset="0"/>
-                        </a:rPr>
-                        <m:t>2+</m:t>
-                      </m:r>
-                      <m:d>
-                        <m:dPr>
-                          <m:ctrlPr>
-                            <a:rPr lang="uk-UA" i="1">
-                              <a:latin typeface="Cambria Math" panose="02040503050406030204" pitchFamily="18" charset="0"/>
-                            </a:rPr>
-                          </m:ctrlPr>
-                        </m:dPr>
-                        <m:e>
-                          <m:func>
-                            <m:funcPr>
-                              <m:ctrlPr>
-                                <a:rPr lang="uk-UA" i="1">
-                                  <a:latin typeface="Cambria Math" panose="02040503050406030204" pitchFamily="18" charset="0"/>
-                                </a:rPr>
-                              </m:ctrlPr>
-                            </m:funcPr>
-                            <m:fName>
-                              <m:r>
-                                <m:rPr>
-                                  <m:sty m:val="p"/>
-                                </m:rPr>
-                                <a:rPr lang="uk-UA" i="0">
-                                  <a:latin typeface="Cambria Math" panose="02040503050406030204" pitchFamily="18" charset="0"/>
-                                </a:rPr>
-                                <m:t>sin</m:t>
-                              </m:r>
-                            </m:fName>
-                            <m:e>
-                              <m:d>
-                                <m:dPr>
-                                  <m:ctrlPr>
-                                    <a:rPr lang="uk-UA" i="1">
-                                      <a:latin typeface="Cambria Math" panose="02040503050406030204" pitchFamily="18" charset="0"/>
-                                    </a:rPr>
-                                  </m:ctrlPr>
-                                </m:dPr>
-                                <m:e>
-                                  <m:f>
-                                    <m:fPr>
-                                      <m:type m:val="lin"/>
-                                      <m:ctrlPr>
-                                        <a:rPr lang="uk-UA" i="1">
-                                          <a:latin typeface="Cambria Math" panose="02040503050406030204" pitchFamily="18" charset="0"/>
-                                        </a:rPr>
-                                      </m:ctrlPr>
-                                    </m:fPr>
-                                    <m:num>
-                                      <m:r>
-                                        <a:rPr lang="uk-UA" i="1">
-                                          <a:latin typeface="Cambria Math" panose="02040503050406030204" pitchFamily="18" charset="0"/>
-                                        </a:rPr>
-                                        <m:t>𝜋</m:t>
-                                      </m:r>
-                                    </m:num>
-                                    <m:den>
-                                      <m:r>
-                                        <a:rPr lang="uk-UA" i="0">
-                                          <a:latin typeface="Cambria Math" panose="02040503050406030204" pitchFamily="18" charset="0"/>
-                                        </a:rPr>
-                                        <m:t>2</m:t>
-                                      </m:r>
-                                    </m:den>
-                                  </m:f>
-                                </m:e>
-                              </m:d>
-                            </m:e>
-                          </m:func>
-                          <m:r>
-                            <a:rPr lang="uk-UA" i="0">
-                              <a:latin typeface="Cambria Math" panose="02040503050406030204" pitchFamily="18" charset="0"/>
-                            </a:rPr>
-                            <m:t>+</m:t>
-                          </m:r>
-                          <m:sSub>
-                            <m:sSubPr>
-                              <m:ctrlPr>
-                                <a:rPr lang="uk-UA" i="1">
-                                  <a:latin typeface="Cambria Math" panose="02040503050406030204" pitchFamily="18" charset="0"/>
-                                </a:rPr>
-                              </m:ctrlPr>
-                            </m:sSubPr>
-                            <m:e>
-                              <m:r>
-                                <a:rPr lang="uk-UA" i="1">
-                                  <a:latin typeface="Cambria Math" panose="02040503050406030204" pitchFamily="18" charset="0"/>
-                                </a:rPr>
-                                <m:t>𝑙𝑜𝑔</m:t>
-                              </m:r>
-                            </m:e>
-                            <m:sub>
-                              <m:r>
-                                <a:rPr lang="uk-UA" i="0">
-                                  <a:latin typeface="Cambria Math" panose="02040503050406030204" pitchFamily="18" charset="0"/>
-                                </a:rPr>
-                                <m:t>2</m:t>
-                              </m:r>
-                            </m:sub>
-                          </m:sSub>
-                          <m:d>
-                            <m:dPr>
-                              <m:ctrlPr>
-                                <a:rPr lang="uk-UA" i="1">
-                                  <a:latin typeface="Cambria Math" panose="02040503050406030204" pitchFamily="18" charset="0"/>
-                                </a:rPr>
-                              </m:ctrlPr>
-                            </m:dPr>
-                            <m:e>
-                              <m:r>
-                                <a:rPr lang="uk-UA" i="0">
-                                  <a:latin typeface="Cambria Math" panose="02040503050406030204" pitchFamily="18" charset="0"/>
-                                </a:rPr>
-                                <m:t>4</m:t>
-                              </m:r>
-                            </m:e>
-                          </m:d>
-                        </m:e>
-                      </m:d>
-                      <m:r>
-                        <a:rPr lang="uk-UA" i="0">
-                          <a:latin typeface="Cambria Math" panose="02040503050406030204" pitchFamily="18" charset="0"/>
-                        </a:rPr>
-                        <m:t>!</m:t>
-                      </m:r>
-                    </m:oMath>
-                  </m:oMathPara>
-                </a14:m>
-                <a:endParaRPr lang="uk-UA" dirty="0"/>
-              </a:p>
-            </p:txBody>
-          </p:sp>
-        </mc:Choice>
-        <mc:Fallback xmlns="">
-          <p:sp>
-            <p:nvSpPr>
-              <p:cNvPr id="12" name="Прямокутник 11">
-                <a:extLst>
-                  <a:ext uri="{FF2B5EF4-FFF2-40B4-BE49-F238E27FC236}">
-                    <a16:creationId xmlns:a16="http://schemas.microsoft.com/office/drawing/2014/main" id="{1623C0CC-AE55-4B0A-9584-9AB4FA857426}"/>
-                  </a:ext>
-                </a:extLst>
-              </p:cNvPr>
-              <p:cNvSpPr>
-                <a:spLocks noRot="1" noChangeAspect="1" noMove="1" noResize="1" noEditPoints="1" noAdjustHandles="1" noChangeArrowheads="1" noChangeShapeType="1" noTextEdit="1"/>
-              </p:cNvSpPr>
-              <p:nvPr/>
-            </p:nvSpPr>
-            <p:spPr>
-              <a:xfrm>
-                <a:off x="3138985" y="1802497"/>
-                <a:ext cx="6634212" cy="404983"/>
-              </a:xfrm>
-              <a:prstGeom prst="rect">
-                <a:avLst/>
-              </a:prstGeom>
-              <a:blipFill>
-                <a:blip r:embed="rId2"/>
-                <a:stretch>
-                  <a:fillRect t="-101515" b="-160606"/>
-                </a:stretch>
-              </a:blipFill>
-            </p:spPr>
-            <p:txBody>
-              <a:bodyPr/>
-              <a:lstStyle/>
-              <a:p>
-                <a:r>
-                  <a:rPr lang="uk-UA">
-                    <a:noFill/>
-                  </a:rPr>
-                  <a:t> </a:t>
-                </a:r>
-              </a:p>
-            </p:txBody>
-          </p:sp>
-        </mc:Fallback>
-      </mc:AlternateContent>
-      <p:graphicFrame>
-        <p:nvGraphicFramePr>
-          <p:cNvPr id="13" name="Схема 12">
-            <a:extLst>
-              <a:ext uri="{FF2B5EF4-FFF2-40B4-BE49-F238E27FC236}">
-                <a16:creationId xmlns:a16="http://schemas.microsoft.com/office/drawing/2014/main" id="{4D825343-1C3D-4AE8-8426-1E601ADC15A1}"/>
-              </a:ext>
-            </a:extLst>
-          </p:cNvPr>
-          <p:cNvGraphicFramePr/>
-          <p:nvPr/>
-        </p:nvGraphicFramePr>
-        <p:xfrm>
-          <a:off x="552948" y="1681297"/>
-          <a:ext cx="5172075" cy="4495800"/>
-        </p:xfrm>
-        <a:graphic>
-          <a:graphicData uri="http://schemas.openxmlformats.org/drawingml/2006/diagram">
-            <dgm:relIds xmlns:dgm="http://schemas.openxmlformats.org/drawingml/2006/diagram" xmlns:r="http://schemas.openxmlformats.org/officeDocument/2006/relationships" r:dm="rId3" r:lo="rId4" r:qs="rId5" r:cs="rId6"/>
-          </a:graphicData>
-        </a:graphic>
-      </p:graphicFrame>
-      <p:sp>
-        <p:nvSpPr>
-          <p:cNvPr id="3" name="Місце для номера слайда 2">
-            <a:extLst>
-              <a:ext uri="{FF2B5EF4-FFF2-40B4-BE49-F238E27FC236}">
-                <a16:creationId xmlns:a16="http://schemas.microsoft.com/office/drawing/2014/main" id="{3A9029A4-80F5-4C04-858B-B4576AE73F44}"/>
+                <a16:creationId xmlns:a16="http://schemas.microsoft.com/office/drawing/2014/main" id="{A03B0497-106F-4379-98E4-8CB38450526A}"/>
               </a:ext>
             </a:extLst>
           </p:cNvPr>
@@ -22015,10 +21311,70 @@
           </a:p>
         </p:txBody>
       </p:sp>
+      <p:sp>
+        <p:nvSpPr>
+          <p:cNvPr id="4" name="TextBox 3">
+            <a:extLst>
+              <a:ext uri="{FF2B5EF4-FFF2-40B4-BE49-F238E27FC236}">
+                <a16:creationId xmlns:a16="http://schemas.microsoft.com/office/drawing/2014/main" id="{A92D65C3-08D3-4DB9-8C2B-36D610F4BA67}"/>
+              </a:ext>
+            </a:extLst>
+          </p:cNvPr>
+          <p:cNvSpPr txBox="1"/>
+          <p:nvPr/>
+        </p:nvSpPr>
+        <p:spPr>
+          <a:xfrm>
+            <a:off x="1200150" y="2386744"/>
+            <a:ext cx="6743700" cy="1645920"/>
+          </a:xfrm>
+          <a:prstGeom prst="rect">
+            <a:avLst/>
+          </a:prstGeom>
+          <a:solidFill>
+            <a:schemeClr val="tx1"/>
+          </a:solidFill>
+          <a:ln w="190500" cmpd="thinThick">
+            <a:solidFill>
+              <a:schemeClr val="tx1"/>
+            </a:solidFill>
+          </a:ln>
+        </p:spPr>
+        <p:txBody>
+          <a:bodyPr vert="horz" lIns="274320" tIns="182880" rIns="274320" bIns="182880" rtlCol="0" anchor="ctr" anchorCtr="1">
+            <a:normAutofit/>
+          </a:bodyPr>
+          <a:lstStyle/>
+          <a:p>
+            <a:pPr algn="ctr" defTabSz="914400">
+              <a:lnSpc>
+                <a:spcPct val="90000"/>
+              </a:lnSpc>
+              <a:spcBef>
+                <a:spcPct val="0"/>
+              </a:spcBef>
+              <a:spcAft>
+                <a:spcPts val="600"/>
+              </a:spcAft>
+            </a:pPr>
+            <a:r>
+              <a:rPr lang="en-US" sz="8800" b="1" kern="1200" cap="all" spc="200" baseline="0">
+                <a:solidFill>
+                  <a:schemeClr val="bg1"/>
+                </a:solidFill>
+                <a:latin typeface="+mj-lt"/>
+                <a:ea typeface="+mj-ea"/>
+                <a:cs typeface="+mj-cs"/>
+              </a:rPr>
+              <a:t>DEMO</a:t>
+            </a:r>
+          </a:p>
+        </p:txBody>
+      </p:sp>
     </p:spTree>
     <p:extLst>
       <p:ext uri="{BB962C8B-B14F-4D97-AF65-F5344CB8AC3E}">
-        <p14:creationId xmlns:p14="http://schemas.microsoft.com/office/powerpoint/2010/main" val="853454014"/>
+        <p14:creationId xmlns:p14="http://schemas.microsoft.com/office/powerpoint/2010/main" val="1785164139"/>
       </p:ext>
     </p:extLst>
   </p:cSld>
@@ -37314,6 +36670,769 @@
       </p:grpSpPr>
       <p:sp>
         <p:nvSpPr>
+          <p:cNvPr id="2" name="TextBox 1">
+            <a:extLst>
+              <a:ext uri="{FF2B5EF4-FFF2-40B4-BE49-F238E27FC236}">
+                <a16:creationId xmlns:a16="http://schemas.microsoft.com/office/drawing/2014/main" id="{3C061724-5385-49B8-8B03-210533F79FC9}"/>
+              </a:ext>
+            </a:extLst>
+          </p:cNvPr>
+          <p:cNvSpPr txBox="1"/>
+          <p:nvPr/>
+        </p:nvSpPr>
+        <p:spPr>
+          <a:xfrm>
+            <a:off x="1187740" y="280180"/>
+            <a:ext cx="6768520" cy="646331"/>
+          </a:xfrm>
+          <a:prstGeom prst="rect">
+            <a:avLst/>
+          </a:prstGeom>
+          <a:noFill/>
+        </p:spPr>
+        <p:txBody>
+          <a:bodyPr wrap="none" rtlCol="0">
+            <a:spAutoFit/>
+          </a:bodyPr>
+          <a:lstStyle/>
+          <a:p>
+            <a:r>
+              <a:rPr lang="uk-UA" sz="3600" dirty="0"/>
+              <a:t>Підрахунок розпізнаного виразу</a:t>
+            </a:r>
+          </a:p>
+        </p:txBody>
+      </p:sp>
+      <p:grpSp>
+        <p:nvGrpSpPr>
+          <p:cNvPr id="10" name="Групувати 9">
+            <a:extLst>
+              <a:ext uri="{FF2B5EF4-FFF2-40B4-BE49-F238E27FC236}">
+                <a16:creationId xmlns:a16="http://schemas.microsoft.com/office/drawing/2014/main" id="{5832C6A6-CCDF-4831-95E9-CA8CC5FCB404}"/>
+              </a:ext>
+            </a:extLst>
+          </p:cNvPr>
+          <p:cNvGrpSpPr/>
+          <p:nvPr/>
+        </p:nvGrpSpPr>
+        <p:grpSpPr>
+          <a:xfrm>
+            <a:off x="6787333" y="2655174"/>
+            <a:ext cx="1846211" cy="1169551"/>
+            <a:chOff x="4572000" y="1315616"/>
+            <a:chExt cx="1846211" cy="1169551"/>
+          </a:xfrm>
+        </p:grpSpPr>
+        <p:sp>
+          <p:nvSpPr>
+            <p:cNvPr id="4" name="TextBox 3">
+              <a:extLst>
+                <a:ext uri="{FF2B5EF4-FFF2-40B4-BE49-F238E27FC236}">
+                  <a16:creationId xmlns:a16="http://schemas.microsoft.com/office/drawing/2014/main" id="{57CEE6DA-0293-4AFB-BA10-D330C125A9E5}"/>
+                </a:ext>
+              </a:extLst>
+            </p:cNvPr>
+            <p:cNvSpPr txBox="1"/>
+            <p:nvPr/>
+          </p:nvSpPr>
+          <p:spPr>
+            <a:xfrm>
+              <a:off x="4572000" y="1315616"/>
+              <a:ext cx="1846211" cy="1169551"/>
+            </a:xfrm>
+            <a:prstGeom prst="rect">
+              <a:avLst/>
+            </a:prstGeom>
+            <a:noFill/>
+          </p:spPr>
+          <p:txBody>
+            <a:bodyPr wrap="none" rtlCol="0">
+              <a:spAutoFit/>
+            </a:bodyPr>
+            <a:lstStyle/>
+            <a:p>
+              <a:pPr marL="285750" lvl="0" indent="-285750">
+                <a:buFont typeface="Arial" panose="020B0604020202020204" pitchFamily="34" charset="0"/>
+                <a:buChar char="•"/>
+              </a:pPr>
+              <a:r>
+                <a:rPr lang="uk-UA" sz="1400" dirty="0"/>
+                <a:t>Оператори</a:t>
+              </a:r>
+            </a:p>
+            <a:p>
+              <a:pPr marL="285750" lvl="0" indent="-285750">
+                <a:buFont typeface="Arial" panose="020B0604020202020204" pitchFamily="34" charset="0"/>
+                <a:buChar char="•"/>
+              </a:pPr>
+              <a:r>
+                <a:rPr lang="uk-UA" sz="1400" dirty="0"/>
+                <a:t>Числа і константи</a:t>
+              </a:r>
+            </a:p>
+            <a:p>
+              <a:pPr marL="285750" lvl="0" indent="-285750">
+                <a:buFont typeface="Arial" panose="020B0604020202020204" pitchFamily="34" charset="0"/>
+                <a:buChar char="•"/>
+              </a:pPr>
+              <a:r>
+                <a:rPr lang="uk-UA" sz="1400" dirty="0"/>
+                <a:t>Функції</a:t>
+              </a:r>
+            </a:p>
+            <a:p>
+              <a:pPr marL="285750" lvl="0" indent="-285750">
+                <a:buFont typeface="Arial" panose="020B0604020202020204" pitchFamily="34" charset="0"/>
+                <a:buChar char="•"/>
+              </a:pPr>
+              <a:r>
+                <a:rPr lang="uk-UA" sz="1400" dirty="0" err="1"/>
+                <a:t>Спец.символи</a:t>
+              </a:r>
+              <a:endParaRPr lang="uk-UA" sz="1400" dirty="0"/>
+            </a:p>
+            <a:p>
+              <a:pPr marL="285750" lvl="0" indent="-285750">
+                <a:buFont typeface="Arial" panose="020B0604020202020204" pitchFamily="34" charset="0"/>
+                <a:buChar char="•"/>
+              </a:pPr>
+              <a:r>
+                <a:rPr lang="uk-UA" sz="1400" dirty="0" err="1"/>
+                <a:t>Спец.операції</a:t>
+              </a:r>
+              <a:endParaRPr lang="uk-UA" sz="1400" dirty="0"/>
+            </a:p>
+          </p:txBody>
+        </p:sp>
+        <p:sp>
+          <p:nvSpPr>
+            <p:cNvPr id="5" name="Овал 4">
+              <a:extLst>
+                <a:ext uri="{FF2B5EF4-FFF2-40B4-BE49-F238E27FC236}">
+                  <a16:creationId xmlns:a16="http://schemas.microsoft.com/office/drawing/2014/main" id="{9916A7A6-6D44-46BD-A80C-B8BF7CE102D6}"/>
+                </a:ext>
+              </a:extLst>
+            </p:cNvPr>
+            <p:cNvSpPr/>
+            <p:nvPr/>
+          </p:nvSpPr>
+          <p:spPr>
+            <a:xfrm>
+              <a:off x="4632928" y="1399592"/>
+              <a:ext cx="102637" cy="102637"/>
+            </a:xfrm>
+            <a:prstGeom prst="ellipse">
+              <a:avLst/>
+            </a:prstGeom>
+            <a:solidFill>
+              <a:srgbClr val="00B050"/>
+            </a:solidFill>
+            <a:ln>
+              <a:noFill/>
+            </a:ln>
+          </p:spPr>
+          <p:style>
+            <a:lnRef idx="2">
+              <a:schemeClr val="accent1">
+                <a:shade val="50000"/>
+              </a:schemeClr>
+            </a:lnRef>
+            <a:fillRef idx="1">
+              <a:schemeClr val="accent1"/>
+            </a:fillRef>
+            <a:effectRef idx="0">
+              <a:schemeClr val="accent1"/>
+            </a:effectRef>
+            <a:fontRef idx="minor">
+              <a:schemeClr val="lt1"/>
+            </a:fontRef>
+          </p:style>
+          <p:txBody>
+            <a:bodyPr rtlCol="0" anchor="ctr"/>
+            <a:lstStyle/>
+            <a:p>
+              <a:pPr algn="ctr"/>
+              <a:endParaRPr lang="uk-UA"/>
+            </a:p>
+          </p:txBody>
+        </p:sp>
+        <p:sp>
+          <p:nvSpPr>
+            <p:cNvPr id="6" name="Овал 5">
+              <a:extLst>
+                <a:ext uri="{FF2B5EF4-FFF2-40B4-BE49-F238E27FC236}">
+                  <a16:creationId xmlns:a16="http://schemas.microsoft.com/office/drawing/2014/main" id="{6E252A27-AE78-47F7-92B2-0202A0D0A149}"/>
+                </a:ext>
+              </a:extLst>
+            </p:cNvPr>
+            <p:cNvSpPr/>
+            <p:nvPr/>
+          </p:nvSpPr>
+          <p:spPr>
+            <a:xfrm>
+              <a:off x="4632928" y="1623429"/>
+              <a:ext cx="102637" cy="102637"/>
+            </a:xfrm>
+            <a:prstGeom prst="ellipse">
+              <a:avLst/>
+            </a:prstGeom>
+            <a:solidFill>
+              <a:srgbClr val="0070C0"/>
+            </a:solidFill>
+            <a:ln>
+              <a:noFill/>
+            </a:ln>
+          </p:spPr>
+          <p:style>
+            <a:lnRef idx="2">
+              <a:schemeClr val="accent1">
+                <a:shade val="50000"/>
+              </a:schemeClr>
+            </a:lnRef>
+            <a:fillRef idx="1">
+              <a:schemeClr val="accent1"/>
+            </a:fillRef>
+            <a:effectRef idx="0">
+              <a:schemeClr val="accent1"/>
+            </a:effectRef>
+            <a:fontRef idx="minor">
+              <a:schemeClr val="lt1"/>
+            </a:fontRef>
+          </p:style>
+          <p:txBody>
+            <a:bodyPr rtlCol="0" anchor="ctr"/>
+            <a:lstStyle/>
+            <a:p>
+              <a:pPr algn="ctr"/>
+              <a:endParaRPr lang="uk-UA"/>
+            </a:p>
+          </p:txBody>
+        </p:sp>
+        <p:sp>
+          <p:nvSpPr>
+            <p:cNvPr id="7" name="Овал 6">
+              <a:extLst>
+                <a:ext uri="{FF2B5EF4-FFF2-40B4-BE49-F238E27FC236}">
+                  <a16:creationId xmlns:a16="http://schemas.microsoft.com/office/drawing/2014/main" id="{BE3A3A03-431D-45CE-A5CA-43881A8E17A0}"/>
+                </a:ext>
+              </a:extLst>
+            </p:cNvPr>
+            <p:cNvSpPr/>
+            <p:nvPr/>
+          </p:nvSpPr>
+          <p:spPr>
+            <a:xfrm>
+              <a:off x="4632928" y="1840015"/>
+              <a:ext cx="102637" cy="102637"/>
+            </a:xfrm>
+            <a:prstGeom prst="ellipse">
+              <a:avLst/>
+            </a:prstGeom>
+            <a:solidFill>
+              <a:srgbClr val="FF0000"/>
+            </a:solidFill>
+            <a:ln>
+              <a:noFill/>
+            </a:ln>
+          </p:spPr>
+          <p:style>
+            <a:lnRef idx="2">
+              <a:schemeClr val="accent1">
+                <a:shade val="50000"/>
+              </a:schemeClr>
+            </a:lnRef>
+            <a:fillRef idx="1">
+              <a:schemeClr val="accent1"/>
+            </a:fillRef>
+            <a:effectRef idx="0">
+              <a:schemeClr val="accent1"/>
+            </a:effectRef>
+            <a:fontRef idx="minor">
+              <a:schemeClr val="lt1"/>
+            </a:fontRef>
+          </p:style>
+          <p:txBody>
+            <a:bodyPr rtlCol="0" anchor="ctr"/>
+            <a:lstStyle/>
+            <a:p>
+              <a:pPr algn="ctr"/>
+              <a:endParaRPr lang="uk-UA"/>
+            </a:p>
+          </p:txBody>
+        </p:sp>
+        <p:sp>
+          <p:nvSpPr>
+            <p:cNvPr id="8" name="Овал 7">
+              <a:extLst>
+                <a:ext uri="{FF2B5EF4-FFF2-40B4-BE49-F238E27FC236}">
+                  <a16:creationId xmlns:a16="http://schemas.microsoft.com/office/drawing/2014/main" id="{DD8CB437-4E15-41B7-A41C-D6A54431EB93}"/>
+                </a:ext>
+              </a:extLst>
+            </p:cNvPr>
+            <p:cNvSpPr/>
+            <p:nvPr/>
+          </p:nvSpPr>
+          <p:spPr>
+            <a:xfrm>
+              <a:off x="4632928" y="2056601"/>
+              <a:ext cx="102637" cy="102637"/>
+            </a:xfrm>
+            <a:prstGeom prst="ellipse">
+              <a:avLst/>
+            </a:prstGeom>
+            <a:solidFill>
+              <a:srgbClr val="7030A0"/>
+            </a:solidFill>
+            <a:ln>
+              <a:solidFill>
+                <a:srgbClr val="7030A0"/>
+              </a:solidFill>
+            </a:ln>
+          </p:spPr>
+          <p:style>
+            <a:lnRef idx="2">
+              <a:schemeClr val="accent1">
+                <a:shade val="50000"/>
+              </a:schemeClr>
+            </a:lnRef>
+            <a:fillRef idx="1">
+              <a:schemeClr val="accent1"/>
+            </a:fillRef>
+            <a:effectRef idx="0">
+              <a:schemeClr val="accent1"/>
+            </a:effectRef>
+            <a:fontRef idx="minor">
+              <a:schemeClr val="lt1"/>
+            </a:fontRef>
+          </p:style>
+          <p:txBody>
+            <a:bodyPr rtlCol="0" anchor="ctr"/>
+            <a:lstStyle/>
+            <a:p>
+              <a:pPr algn="ctr"/>
+              <a:endParaRPr lang="uk-UA"/>
+            </a:p>
+          </p:txBody>
+        </p:sp>
+        <p:sp>
+          <p:nvSpPr>
+            <p:cNvPr id="9" name="Овал 8">
+              <a:extLst>
+                <a:ext uri="{FF2B5EF4-FFF2-40B4-BE49-F238E27FC236}">
+                  <a16:creationId xmlns:a16="http://schemas.microsoft.com/office/drawing/2014/main" id="{41971994-0034-4CCC-A3DD-54D084F409DD}"/>
+                </a:ext>
+              </a:extLst>
+            </p:cNvPr>
+            <p:cNvSpPr/>
+            <p:nvPr/>
+          </p:nvSpPr>
+          <p:spPr>
+            <a:xfrm>
+              <a:off x="4632928" y="2270884"/>
+              <a:ext cx="102637" cy="102637"/>
+            </a:xfrm>
+            <a:prstGeom prst="ellipse">
+              <a:avLst/>
+            </a:prstGeom>
+            <a:solidFill>
+              <a:srgbClr val="FFC000"/>
+            </a:solidFill>
+            <a:ln>
+              <a:solidFill>
+                <a:srgbClr val="FFC000"/>
+              </a:solidFill>
+            </a:ln>
+          </p:spPr>
+          <p:style>
+            <a:lnRef idx="2">
+              <a:schemeClr val="accent1">
+                <a:shade val="50000"/>
+              </a:schemeClr>
+            </a:lnRef>
+            <a:fillRef idx="1">
+              <a:schemeClr val="accent1"/>
+            </a:fillRef>
+            <a:effectRef idx="0">
+              <a:schemeClr val="accent1"/>
+            </a:effectRef>
+            <a:fontRef idx="minor">
+              <a:schemeClr val="lt1"/>
+            </a:fontRef>
+          </p:style>
+          <p:txBody>
+            <a:bodyPr rtlCol="0" anchor="ctr"/>
+            <a:lstStyle/>
+            <a:p>
+              <a:pPr algn="ctr"/>
+              <a:endParaRPr lang="uk-UA" dirty="0"/>
+            </a:p>
+          </p:txBody>
+        </p:sp>
+      </p:grpSp>
+      <p:sp>
+        <p:nvSpPr>
+          <p:cNvPr id="11" name="TextBox 10">
+            <a:extLst>
+              <a:ext uri="{FF2B5EF4-FFF2-40B4-BE49-F238E27FC236}">
+                <a16:creationId xmlns:a16="http://schemas.microsoft.com/office/drawing/2014/main" id="{D3185019-F10D-4213-A0F8-B9FF851277EE}"/>
+              </a:ext>
+            </a:extLst>
+          </p:cNvPr>
+          <p:cNvSpPr txBox="1"/>
+          <p:nvPr/>
+        </p:nvSpPr>
+        <p:spPr>
+          <a:xfrm>
+            <a:off x="4040850" y="1311965"/>
+            <a:ext cx="1592103" cy="369332"/>
+          </a:xfrm>
+          <a:prstGeom prst="rect">
+            <a:avLst/>
+          </a:prstGeom>
+          <a:noFill/>
+        </p:spPr>
+        <p:txBody>
+          <a:bodyPr wrap="none" rtlCol="0">
+            <a:spAutoFit/>
+          </a:bodyPr>
+          <a:lstStyle/>
+          <a:p>
+            <a:r>
+              <a:rPr lang="uk-UA" dirty="0"/>
+              <a:t>Приклад для:</a:t>
+            </a:r>
+          </a:p>
+        </p:txBody>
+      </p:sp>
+      <mc:AlternateContent xmlns:mc="http://schemas.openxmlformats.org/markup-compatibility/2006" xmlns:a14="http://schemas.microsoft.com/office/drawing/2010/main">
+        <mc:Choice Requires="a14">
+          <p:sp>
+            <p:nvSpPr>
+              <p:cNvPr id="12" name="Прямокутник 11">
+                <a:extLst>
+                  <a:ext uri="{FF2B5EF4-FFF2-40B4-BE49-F238E27FC236}">
+                    <a16:creationId xmlns:a16="http://schemas.microsoft.com/office/drawing/2014/main" id="{1623C0CC-AE55-4B0A-9584-9AB4FA857426}"/>
+                  </a:ext>
+                </a:extLst>
+              </p:cNvPr>
+              <p:cNvSpPr/>
+              <p:nvPr/>
+            </p:nvSpPr>
+            <p:spPr>
+              <a:xfrm>
+                <a:off x="3138985" y="1802497"/>
+                <a:ext cx="6634212" cy="404983"/>
+              </a:xfrm>
+              <a:prstGeom prst="rect">
+                <a:avLst/>
+              </a:prstGeom>
+            </p:spPr>
+            <p:txBody>
+              <a:bodyPr wrap="square">
+                <a:spAutoFit/>
+              </a:bodyPr>
+              <a:lstStyle/>
+              <a:p>
+                <a:pPr/>
+                <a14:m>
+                  <m:oMathPara xmlns:m="http://schemas.openxmlformats.org/officeDocument/2006/math">
+                    <m:oMathParaPr>
+                      <m:jc m:val="centerGroup"/>
+                    </m:oMathParaPr>
+                    <m:oMath xmlns:m="http://schemas.openxmlformats.org/officeDocument/2006/math">
+                      <m:r>
+                        <a:rPr lang="uk-UA" smtClean="0">
+                          <a:latin typeface="Cambria Math" panose="02040503050406030204" pitchFamily="18" charset="0"/>
+                        </a:rPr>
+                        <m:t>1</m:t>
+                      </m:r>
+                      <m:r>
+                        <a:rPr lang="en-US" b="0" i="0" smtClean="0">
+                          <a:latin typeface="Cambria Math" panose="02040503050406030204" pitchFamily="18" charset="0"/>
+                        </a:rPr>
+                        <m:t>6</m:t>
+                      </m:r>
+                      <m:r>
+                        <a:rPr lang="uk-UA" i="0">
+                          <a:latin typeface="Cambria Math" panose="02040503050406030204" pitchFamily="18" charset="0"/>
+                        </a:rPr>
+                        <m:t>+2∗(5−|−2|)</m:t>
+                      </m:r>
+                      <m:r>
+                        <m:rPr>
+                          <m:lit/>
+                        </m:rPr>
+                        <a:rPr lang="uk-UA" i="0">
+                          <a:latin typeface="Cambria Math" panose="02040503050406030204" pitchFamily="18" charset="0"/>
+                        </a:rPr>
+                        <m:t>^</m:t>
+                      </m:r>
+                      <m:r>
+                        <a:rPr lang="uk-UA" i="0">
+                          <a:latin typeface="Cambria Math" panose="02040503050406030204" pitchFamily="18" charset="0"/>
+                        </a:rPr>
+                        <m:t>2+</m:t>
+                      </m:r>
+                      <m:d>
+                        <m:dPr>
+                          <m:ctrlPr>
+                            <a:rPr lang="uk-UA" i="1">
+                              <a:latin typeface="Cambria Math" panose="02040503050406030204" pitchFamily="18" charset="0"/>
+                            </a:rPr>
+                          </m:ctrlPr>
+                        </m:dPr>
+                        <m:e>
+                          <m:func>
+                            <m:funcPr>
+                              <m:ctrlPr>
+                                <a:rPr lang="uk-UA" i="1">
+                                  <a:latin typeface="Cambria Math" panose="02040503050406030204" pitchFamily="18" charset="0"/>
+                                </a:rPr>
+                              </m:ctrlPr>
+                            </m:funcPr>
+                            <m:fName>
+                              <m:r>
+                                <m:rPr>
+                                  <m:sty m:val="p"/>
+                                </m:rPr>
+                                <a:rPr lang="uk-UA" i="0">
+                                  <a:latin typeface="Cambria Math" panose="02040503050406030204" pitchFamily="18" charset="0"/>
+                                </a:rPr>
+                                <m:t>sin</m:t>
+                              </m:r>
+                            </m:fName>
+                            <m:e>
+                              <m:d>
+                                <m:dPr>
+                                  <m:ctrlPr>
+                                    <a:rPr lang="uk-UA" i="1">
+                                      <a:latin typeface="Cambria Math" panose="02040503050406030204" pitchFamily="18" charset="0"/>
+                                    </a:rPr>
+                                  </m:ctrlPr>
+                                </m:dPr>
+                                <m:e>
+                                  <m:f>
+                                    <m:fPr>
+                                      <m:type m:val="lin"/>
+                                      <m:ctrlPr>
+                                        <a:rPr lang="uk-UA" i="1">
+                                          <a:latin typeface="Cambria Math" panose="02040503050406030204" pitchFamily="18" charset="0"/>
+                                        </a:rPr>
+                                      </m:ctrlPr>
+                                    </m:fPr>
+                                    <m:num>
+                                      <m:r>
+                                        <a:rPr lang="uk-UA" i="1">
+                                          <a:latin typeface="Cambria Math" panose="02040503050406030204" pitchFamily="18" charset="0"/>
+                                        </a:rPr>
+                                        <m:t>𝜋</m:t>
+                                      </m:r>
+                                    </m:num>
+                                    <m:den>
+                                      <m:r>
+                                        <a:rPr lang="uk-UA" i="0">
+                                          <a:latin typeface="Cambria Math" panose="02040503050406030204" pitchFamily="18" charset="0"/>
+                                        </a:rPr>
+                                        <m:t>2</m:t>
+                                      </m:r>
+                                    </m:den>
+                                  </m:f>
+                                </m:e>
+                              </m:d>
+                            </m:e>
+                          </m:func>
+                          <m:r>
+                            <a:rPr lang="uk-UA" i="0">
+                              <a:latin typeface="Cambria Math" panose="02040503050406030204" pitchFamily="18" charset="0"/>
+                            </a:rPr>
+                            <m:t>+</m:t>
+                          </m:r>
+                          <m:sSub>
+                            <m:sSubPr>
+                              <m:ctrlPr>
+                                <a:rPr lang="uk-UA" i="1">
+                                  <a:latin typeface="Cambria Math" panose="02040503050406030204" pitchFamily="18" charset="0"/>
+                                </a:rPr>
+                              </m:ctrlPr>
+                            </m:sSubPr>
+                            <m:e>
+                              <m:r>
+                                <a:rPr lang="uk-UA" i="1">
+                                  <a:latin typeface="Cambria Math" panose="02040503050406030204" pitchFamily="18" charset="0"/>
+                                </a:rPr>
+                                <m:t>𝑙𝑜𝑔</m:t>
+                              </m:r>
+                            </m:e>
+                            <m:sub>
+                              <m:r>
+                                <a:rPr lang="uk-UA" i="0">
+                                  <a:latin typeface="Cambria Math" panose="02040503050406030204" pitchFamily="18" charset="0"/>
+                                </a:rPr>
+                                <m:t>2</m:t>
+                              </m:r>
+                            </m:sub>
+                          </m:sSub>
+                          <m:d>
+                            <m:dPr>
+                              <m:ctrlPr>
+                                <a:rPr lang="uk-UA" i="1">
+                                  <a:latin typeface="Cambria Math" panose="02040503050406030204" pitchFamily="18" charset="0"/>
+                                </a:rPr>
+                              </m:ctrlPr>
+                            </m:dPr>
+                            <m:e>
+                              <m:r>
+                                <a:rPr lang="uk-UA" i="0">
+                                  <a:latin typeface="Cambria Math" panose="02040503050406030204" pitchFamily="18" charset="0"/>
+                                </a:rPr>
+                                <m:t>4</m:t>
+                              </m:r>
+                            </m:e>
+                          </m:d>
+                        </m:e>
+                      </m:d>
+                      <m:r>
+                        <a:rPr lang="uk-UA" i="0">
+                          <a:latin typeface="Cambria Math" panose="02040503050406030204" pitchFamily="18" charset="0"/>
+                        </a:rPr>
+                        <m:t>!</m:t>
+                      </m:r>
+                    </m:oMath>
+                  </m:oMathPara>
+                </a14:m>
+                <a:endParaRPr lang="uk-UA" dirty="0"/>
+              </a:p>
+            </p:txBody>
+          </p:sp>
+        </mc:Choice>
+        <mc:Fallback xmlns="">
+          <p:sp>
+            <p:nvSpPr>
+              <p:cNvPr id="12" name="Прямокутник 11">
+                <a:extLst>
+                  <a:ext uri="{FF2B5EF4-FFF2-40B4-BE49-F238E27FC236}">
+                    <a16:creationId xmlns:a16="http://schemas.microsoft.com/office/drawing/2014/main" id="{1623C0CC-AE55-4B0A-9584-9AB4FA857426}"/>
+                  </a:ext>
+                </a:extLst>
+              </p:cNvPr>
+              <p:cNvSpPr>
+                <a:spLocks noRot="1" noChangeAspect="1" noMove="1" noResize="1" noEditPoints="1" noAdjustHandles="1" noChangeArrowheads="1" noChangeShapeType="1" noTextEdit="1"/>
+              </p:cNvSpPr>
+              <p:nvPr/>
+            </p:nvSpPr>
+            <p:spPr>
+              <a:xfrm>
+                <a:off x="3138985" y="1802497"/>
+                <a:ext cx="6634212" cy="404983"/>
+              </a:xfrm>
+              <a:prstGeom prst="rect">
+                <a:avLst/>
+              </a:prstGeom>
+              <a:blipFill>
+                <a:blip r:embed="rId2"/>
+                <a:stretch>
+                  <a:fillRect t="-101515" b="-160606"/>
+                </a:stretch>
+              </a:blipFill>
+            </p:spPr>
+            <p:txBody>
+              <a:bodyPr/>
+              <a:lstStyle/>
+              <a:p>
+                <a:r>
+                  <a:rPr lang="uk-UA">
+                    <a:noFill/>
+                  </a:rPr>
+                  <a:t> </a:t>
+                </a:r>
+              </a:p>
+            </p:txBody>
+          </p:sp>
+        </mc:Fallback>
+      </mc:AlternateContent>
+      <p:graphicFrame>
+        <p:nvGraphicFramePr>
+          <p:cNvPr id="13" name="Схема 12">
+            <a:extLst>
+              <a:ext uri="{FF2B5EF4-FFF2-40B4-BE49-F238E27FC236}">
+                <a16:creationId xmlns:a16="http://schemas.microsoft.com/office/drawing/2014/main" id="{4D825343-1C3D-4AE8-8426-1E601ADC15A1}"/>
+              </a:ext>
+            </a:extLst>
+          </p:cNvPr>
+          <p:cNvGraphicFramePr/>
+          <p:nvPr/>
+        </p:nvGraphicFramePr>
+        <p:xfrm>
+          <a:off x="552948" y="1681297"/>
+          <a:ext cx="5172075" cy="4495800"/>
+        </p:xfrm>
+        <a:graphic>
+          <a:graphicData uri="http://schemas.openxmlformats.org/drawingml/2006/diagram">
+            <dgm:relIds xmlns:dgm="http://schemas.openxmlformats.org/drawingml/2006/diagram" xmlns:r="http://schemas.openxmlformats.org/officeDocument/2006/relationships" r:dm="rId3" r:lo="rId4" r:qs="rId5" r:cs="rId6"/>
+          </a:graphicData>
+        </a:graphic>
+      </p:graphicFrame>
+      <p:sp>
+        <p:nvSpPr>
+          <p:cNvPr id="3" name="Місце для номера слайда 2">
+            <a:extLst>
+              <a:ext uri="{FF2B5EF4-FFF2-40B4-BE49-F238E27FC236}">
+                <a16:creationId xmlns:a16="http://schemas.microsoft.com/office/drawing/2014/main" id="{3A9029A4-80F5-4C04-858B-B4576AE73F44}"/>
+              </a:ext>
+            </a:extLst>
+          </p:cNvPr>
+          <p:cNvSpPr>
+            <a:spLocks noGrp="1"/>
+          </p:cNvSpPr>
+          <p:nvPr>
+            <p:ph type="sldNum" sz="quarter" idx="12"/>
+          </p:nvPr>
+        </p:nvSpPr>
+        <p:spPr/>
+        <p:txBody>
+          <a:bodyPr/>
+          <a:lstStyle/>
+          <a:p>
+            <a:fld id="{6E5AF408-9466-44B4-A19F-6558C198F85A}" type="slidenum">
+              <a:rPr lang="uk-UA" smtClean="0"/>
+              <a:t>8</a:t>
+            </a:fld>
+            <a:endParaRPr lang="uk-UA"/>
+          </a:p>
+        </p:txBody>
+      </p:sp>
+    </p:spTree>
+    <p:extLst>
+      <p:ext uri="{BB962C8B-B14F-4D97-AF65-F5344CB8AC3E}">
+        <p14:creationId xmlns:p14="http://schemas.microsoft.com/office/powerpoint/2010/main" val="853454014"/>
+      </p:ext>
+    </p:extLst>
+  </p:cSld>
+  <p:clrMapOvr>
+    <a:masterClrMapping/>
+  </p:clrMapOvr>
+</p:sld>
+</file>
+
+<file path=ppt/slides/slide9.xml><?xml version="1.0" encoding="utf-8"?>
+<p:sld xmlns:a="http://schemas.openxmlformats.org/drawingml/2006/main" xmlns:r="http://schemas.openxmlformats.org/officeDocument/2006/relationships" xmlns:p="http://schemas.openxmlformats.org/presentationml/2006/main">
+  <p:cSld>
+    <p:spTree>
+      <p:nvGrpSpPr>
+        <p:cNvPr id="1" name=""/>
+        <p:cNvGrpSpPr/>
+        <p:nvPr/>
+      </p:nvGrpSpPr>
+      <p:grpSpPr>
+        <a:xfrm>
+          <a:off x="0" y="0"/>
+          <a:ext cx="0" cy="0"/>
+          <a:chOff x="0" y="0"/>
+          <a:chExt cx="0" cy="0"/>
+        </a:xfrm>
+      </p:grpSpPr>
+      <p:sp>
+        <p:nvSpPr>
           <p:cNvPr id="7" name="Прямокутник 6">
             <a:extLst>
               <a:ext uri="{FF2B5EF4-FFF2-40B4-BE49-F238E27FC236}">
@@ -37822,7 +37941,7 @@
           <a:p>
             <a:fld id="{6E5AF408-9466-44B4-A19F-6558C198F85A}" type="slidenum">
               <a:rPr lang="uk-UA" smtClean="0"/>
-              <a:t>8</a:t>
+              <a:t>9</a:t>
             </a:fld>
             <a:endParaRPr lang="uk-UA"/>
           </a:p>
@@ -37893,125 +38012,6 @@
     <p:extLst>
       <p:ext uri="{BB962C8B-B14F-4D97-AF65-F5344CB8AC3E}">
         <p14:creationId xmlns:p14="http://schemas.microsoft.com/office/powerpoint/2010/main" val="245848724"/>
-      </p:ext>
-    </p:extLst>
-  </p:cSld>
-  <p:clrMapOvr>
-    <a:masterClrMapping/>
-  </p:clrMapOvr>
-</p:sld>
-</file>
-
-<file path=ppt/slides/slide9.xml><?xml version="1.0" encoding="utf-8"?>
-<p:sld xmlns:a="http://schemas.openxmlformats.org/drawingml/2006/main" xmlns:r="http://schemas.openxmlformats.org/officeDocument/2006/relationships" xmlns:p="http://schemas.openxmlformats.org/presentationml/2006/main">
-  <p:cSld>
-    <p:spTree>
-      <p:nvGrpSpPr>
-        <p:cNvPr id="1" name=""/>
-        <p:cNvGrpSpPr/>
-        <p:nvPr/>
-      </p:nvGrpSpPr>
-      <p:grpSpPr>
-        <a:xfrm>
-          <a:off x="0" y="0"/>
-          <a:ext cx="0" cy="0"/>
-          <a:chOff x="0" y="0"/>
-          <a:chExt cx="0" cy="0"/>
-        </a:xfrm>
-      </p:grpSpPr>
-      <p:sp>
-        <p:nvSpPr>
-          <p:cNvPr id="2" name="Місце для номера слайда 1">
-            <a:extLst>
-              <a:ext uri="{FF2B5EF4-FFF2-40B4-BE49-F238E27FC236}">
-                <a16:creationId xmlns:a16="http://schemas.microsoft.com/office/drawing/2014/main" id="{A03B0497-106F-4379-98E4-8CB38450526A}"/>
-              </a:ext>
-            </a:extLst>
-          </p:cNvPr>
-          <p:cNvSpPr>
-            <a:spLocks noGrp="1"/>
-          </p:cNvSpPr>
-          <p:nvPr>
-            <p:ph type="sldNum" sz="quarter" idx="12"/>
-          </p:nvPr>
-        </p:nvSpPr>
-        <p:spPr/>
-        <p:txBody>
-          <a:bodyPr/>
-          <a:lstStyle/>
-          <a:p>
-            <a:fld id="{6E5AF408-9466-44B4-A19F-6558C198F85A}" type="slidenum">
-              <a:rPr lang="uk-UA" smtClean="0"/>
-              <a:t>9</a:t>
-            </a:fld>
-            <a:endParaRPr lang="uk-UA"/>
-          </a:p>
-        </p:txBody>
-      </p:sp>
-      <p:sp>
-        <p:nvSpPr>
-          <p:cNvPr id="4" name="TextBox 3">
-            <a:extLst>
-              <a:ext uri="{FF2B5EF4-FFF2-40B4-BE49-F238E27FC236}">
-                <a16:creationId xmlns:a16="http://schemas.microsoft.com/office/drawing/2014/main" id="{A92D65C3-08D3-4DB9-8C2B-36D610F4BA67}"/>
-              </a:ext>
-            </a:extLst>
-          </p:cNvPr>
-          <p:cNvSpPr txBox="1"/>
-          <p:nvPr/>
-        </p:nvSpPr>
-        <p:spPr>
-          <a:xfrm>
-            <a:off x="1200150" y="2386744"/>
-            <a:ext cx="6743700" cy="1645920"/>
-          </a:xfrm>
-          <a:prstGeom prst="rect">
-            <a:avLst/>
-          </a:prstGeom>
-          <a:solidFill>
-            <a:schemeClr val="tx1"/>
-          </a:solidFill>
-          <a:ln w="190500" cmpd="thinThick">
-            <a:solidFill>
-              <a:schemeClr val="tx1"/>
-            </a:solidFill>
-          </a:ln>
-        </p:spPr>
-        <p:txBody>
-          <a:bodyPr vert="horz" lIns="274320" tIns="182880" rIns="274320" bIns="182880" rtlCol="0" anchor="ctr" anchorCtr="1">
-            <a:normAutofit/>
-          </a:bodyPr>
-          <a:lstStyle/>
-          <a:p>
-            <a:pPr algn="ctr" defTabSz="914400">
-              <a:lnSpc>
-                <a:spcPct val="90000"/>
-              </a:lnSpc>
-              <a:spcBef>
-                <a:spcPct val="0"/>
-              </a:spcBef>
-              <a:spcAft>
-                <a:spcPts val="600"/>
-              </a:spcAft>
-            </a:pPr>
-            <a:r>
-              <a:rPr lang="en-US" sz="8800" b="1" kern="1200" cap="all" spc="200" baseline="0">
-                <a:solidFill>
-                  <a:schemeClr val="bg1"/>
-                </a:solidFill>
-                <a:latin typeface="+mj-lt"/>
-                <a:ea typeface="+mj-ea"/>
-                <a:cs typeface="+mj-cs"/>
-              </a:rPr>
-              <a:t>DEMO</a:t>
-            </a:r>
-          </a:p>
-        </p:txBody>
-      </p:sp>
-    </p:spTree>
-    <p:extLst>
-      <p:ext uri="{BB962C8B-B14F-4D97-AF65-F5344CB8AC3E}">
-        <p14:creationId xmlns:p14="http://schemas.microsoft.com/office/powerpoint/2010/main" val="1785164139"/>
       </p:ext>
     </p:extLst>
   </p:cSld>

</xml_diff>